<commit_message>
split lesson notebook and assignment
</commit_message>
<xml_diff>
--- a/week 1/Session 1.pptx
+++ b/week 1/Session 1.pptx
@@ -1240,7 +1240,7 @@
           <a:p>
             <a:fld id="{FD0B45B8-76EC-144B-941F-C1621765A4DE}" type="datetimeFigureOut">
               <a:rPr lang="en-US" smtClean="0"/>
-              <a:t>2/1/23</a:t>
+              <a:t>2/2/23</a:t>
             </a:fld>
             <a:endParaRPr lang="en-US"/>
           </a:p>
@@ -2076,7 +2076,7 @@
           <a:p>
             <a:fld id="{1B01F6BC-EC2F-624A-8ACC-A70708598F9D}" type="datetimeFigureOut">
               <a:rPr lang="en-US" smtClean="0"/>
-              <a:t>2/1/23</a:t>
+              <a:t>2/2/23</a:t>
             </a:fld>
             <a:endParaRPr lang="en-US"/>
           </a:p>
@@ -2317,7 +2317,7 @@
           <a:p>
             <a:fld id="{1B01F6BC-EC2F-624A-8ACC-A70708598F9D}" type="datetimeFigureOut">
               <a:rPr lang="en-US" smtClean="0"/>
-              <a:t>2/1/23</a:t>
+              <a:t>2/2/23</a:t>
             </a:fld>
             <a:endParaRPr lang="en-US"/>
           </a:p>
@@ -2676,7 +2676,7 @@
           <a:p>
             <a:fld id="{1B01F6BC-EC2F-624A-8ACC-A70708598F9D}" type="datetimeFigureOut">
               <a:rPr lang="en-US" smtClean="0"/>
-              <a:t>2/1/23</a:t>
+              <a:t>2/2/23</a:t>
             </a:fld>
             <a:endParaRPr lang="en-US"/>
           </a:p>
@@ -3041,7 +3041,7 @@
           <a:p>
             <a:fld id="{1B01F6BC-EC2F-624A-8ACC-A70708598F9D}" type="datetimeFigureOut">
               <a:rPr lang="en-US" smtClean="0"/>
-              <a:t>2/1/23</a:t>
+              <a:t>2/2/23</a:t>
             </a:fld>
             <a:endParaRPr lang="en-US"/>
           </a:p>
@@ -3582,7 +3582,7 @@
           <a:p>
             <a:fld id="{1B01F6BC-EC2F-624A-8ACC-A70708598F9D}" type="datetimeFigureOut">
               <a:rPr lang="en-US" smtClean="0"/>
-              <a:t>2/1/23</a:t>
+              <a:t>2/2/23</a:t>
             </a:fld>
             <a:endParaRPr lang="en-US"/>
           </a:p>
@@ -3695,7 +3695,7 @@
           <a:p>
             <a:fld id="{1B01F6BC-EC2F-624A-8ACC-A70708598F9D}" type="datetimeFigureOut">
               <a:rPr lang="en-US" smtClean="0"/>
-              <a:t>2/1/23</a:t>
+              <a:t>2/2/23</a:t>
             </a:fld>
             <a:endParaRPr lang="en-US"/>
           </a:p>
@@ -3868,7 +3868,7 @@
           <a:p>
             <a:fld id="{1B01F6BC-EC2F-624A-8ACC-A70708598F9D}" type="datetimeFigureOut">
               <a:rPr lang="en-US" smtClean="0"/>
-              <a:t>2/1/23</a:t>
+              <a:t>2/2/23</a:t>
             </a:fld>
             <a:endParaRPr lang="en-US"/>
           </a:p>
@@ -4249,7 +4249,7 @@
             <a:fld id="{1B01F6BC-EC2F-624A-8ACC-A70708598F9D}" type="datetimeFigureOut">
               <a:rPr lang="en-US" smtClean="0"/>
               <a:pPr/>
-              <a:t>2/1/23</a:t>
+              <a:t>2/2/23</a:t>
             </a:fld>
             <a:endParaRPr lang="en-US" dirty="0"/>
           </a:p>
@@ -6382,7 +6382,7 @@
           <a:p>
             <a:r>
               <a:rPr lang="en-US" dirty="0"/>
-              <a:t>Truth: for a lot of tasks, the code is going to be just as complex as the Excel formula would be – “one line of code to invent Facebook” is greatly overblown</a:t>
+              <a:t>Truth: in the beginning, the code will seem just as complex as the Excel formula would be – “one line of code to invent Facebook” is greatly overblown</a:t>
             </a:r>
           </a:p>
           <a:p>
@@ -6845,7 +6845,7 @@
             <a:pPr lvl="1"/>
             <a:r>
               <a:rPr lang="en-US" dirty="0"/>
-              <a:t>You can also install the </a:t>
+              <a:t>You will also install the </a:t>
             </a:r>
             <a:r>
               <a:rPr lang="en-US" dirty="0" err="1"/>
@@ -6853,7 +6853,7 @@
             </a:r>
             <a:r>
               <a:rPr lang="en-US" dirty="0"/>
-              <a:t> development environments to work on your machine with no internet</a:t>
+              <a:t> development environments so you can work directly on your machine with no internet</a:t>
             </a:r>
           </a:p>
           <a:p>
@@ -9052,36 +9052,50 @@
           </a:p>
         </p:txBody>
       </p:sp>
-      <p:pic>
-        <p:nvPicPr>
-          <p:cNvPr id="5" name="Picture 4">
-            <a:extLst>
-              <a:ext uri="{FF2B5EF4-FFF2-40B4-BE49-F238E27FC236}">
-                <a16:creationId xmlns:a16="http://schemas.microsoft.com/office/drawing/2014/main" id="{50920468-8496-8819-1286-CFD5A70BBC31}"/>
-              </a:ext>
-            </a:extLst>
-          </p:cNvPr>
-          <p:cNvPicPr>
-            <a:picLocks noChangeAspect="1"/>
-          </p:cNvPicPr>
+      <p:sp>
+        <p:nvSpPr>
+          <p:cNvPr id="4" name="TextBox 3">
+            <a:extLst>
+              <a:ext uri="{FF2B5EF4-FFF2-40B4-BE49-F238E27FC236}">
+                <a16:creationId xmlns:a16="http://schemas.microsoft.com/office/drawing/2014/main" id="{898531EE-95A9-ED1F-D732-DAB6C2D8D58D}"/>
+              </a:ext>
+            </a:extLst>
+          </p:cNvPr>
+          <p:cNvSpPr txBox="1"/>
           <p:nvPr/>
-        </p:nvPicPr>
-        <p:blipFill>
-          <a:blip r:embed="rId2"/>
-          <a:stretch>
-            <a:fillRect/>
-          </a:stretch>
-        </p:blipFill>
+        </p:nvSpPr>
         <p:spPr>
           <a:xfrm>
-            <a:off x="3260862" y="977365"/>
-            <a:ext cx="5670273" cy="5385335"/>
+            <a:off x="3048000" y="3108144"/>
+            <a:ext cx="6096000" cy="646331"/>
           </a:xfrm>
           <a:prstGeom prst="rect">
             <a:avLst/>
           </a:prstGeom>
+          <a:noFill/>
         </p:spPr>
-      </p:pic>
+        <p:txBody>
+          <a:bodyPr wrap="square">
+            <a:spAutoFit/>
+          </a:bodyPr>
+          <a:lstStyle/>
+          <a:p>
+            <a:r>
+              <a:rPr lang="en-US" dirty="0">
+                <a:latin typeface="Athelas" panose="02000503000000020003" pitchFamily="2" charset="77"/>
+                <a:hlinkClick r:id="rId2"/>
+              </a:rPr>
+              <a:t>https://www.gapminder.org/tools/?from=world#$chart-type=bubbles&amp;url=v1</a:t>
+            </a:r>
+            <a:r>
+              <a:rPr lang="en-US" dirty="0">
+                <a:latin typeface="Athelas" panose="02000503000000020003" pitchFamily="2" charset="77"/>
+              </a:rPr>
+              <a:t> </a:t>
+            </a:r>
+          </a:p>
+        </p:txBody>
+      </p:sp>
     </p:spTree>
     <p:extLst>
       <p:ext uri="{BB962C8B-B14F-4D97-AF65-F5344CB8AC3E}">

</xml_diff>

<commit_message>
add class survey links to deck
</commit_message>
<xml_diff>
--- a/week 1/Session 1.pptx
+++ b/week 1/Session 1.pptx
@@ -5,7 +5,7 @@
     <p:sldMasterId id="2147483648" r:id="rId1"/>
   </p:sldMasterIdLst>
   <p:notesMasterIdLst>
-    <p:notesMasterId r:id="rId24"/>
+    <p:notesMasterId r:id="rId26"/>
   </p:notesMasterIdLst>
   <p:sldIdLst>
     <p:sldId id="256" r:id="rId2"/>
@@ -16,20 +16,22 @@
     <p:sldId id="330" r:id="rId7"/>
     <p:sldId id="331" r:id="rId8"/>
     <p:sldId id="332" r:id="rId9"/>
-    <p:sldId id="335" r:id="rId10"/>
-    <p:sldId id="336" r:id="rId11"/>
-    <p:sldId id="258" r:id="rId12"/>
-    <p:sldId id="337" r:id="rId13"/>
-    <p:sldId id="312" r:id="rId14"/>
-    <p:sldId id="259" r:id="rId15"/>
-    <p:sldId id="329" r:id="rId16"/>
-    <p:sldId id="260" r:id="rId17"/>
-    <p:sldId id="300" r:id="rId18"/>
-    <p:sldId id="338" r:id="rId19"/>
-    <p:sldId id="339" r:id="rId20"/>
-    <p:sldId id="311" r:id="rId21"/>
-    <p:sldId id="313" r:id="rId22"/>
-    <p:sldId id="314" r:id="rId23"/>
+    <p:sldId id="340" r:id="rId10"/>
+    <p:sldId id="335" r:id="rId11"/>
+    <p:sldId id="336" r:id="rId12"/>
+    <p:sldId id="258" r:id="rId13"/>
+    <p:sldId id="337" r:id="rId14"/>
+    <p:sldId id="312" r:id="rId15"/>
+    <p:sldId id="259" r:id="rId16"/>
+    <p:sldId id="329" r:id="rId17"/>
+    <p:sldId id="260" r:id="rId18"/>
+    <p:sldId id="300" r:id="rId19"/>
+    <p:sldId id="338" r:id="rId20"/>
+    <p:sldId id="339" r:id="rId21"/>
+    <p:sldId id="311" r:id="rId22"/>
+    <p:sldId id="313" r:id="rId23"/>
+    <p:sldId id="314" r:id="rId24"/>
+    <p:sldId id="341" r:id="rId25"/>
   </p:sldIdLst>
   <p:sldSz cx="12192000" cy="6858000"/>
   <p:notesSz cx="6858000" cy="9144000"/>
@@ -1908,7 +1910,91 @@
           <a:p>
             <a:fld id="{9D3D7918-AA78-C342-A684-3E56169E53EA}" type="slidenum">
               <a:rPr lang="en-US" smtClean="0"/>
-              <a:t>11</a:t>
+              <a:t>9</a:t>
+            </a:fld>
+            <a:endParaRPr lang="en-US"/>
+          </a:p>
+        </p:txBody>
+      </p:sp>
+    </p:spTree>
+    <p:extLst>
+      <p:ext uri="{BB962C8B-B14F-4D97-AF65-F5344CB8AC3E}">
+        <p14:creationId xmlns:p14="http://schemas.microsoft.com/office/powerpoint/2010/main" val="1567785090"/>
+      </p:ext>
+    </p:extLst>
+  </p:cSld>
+  <p:clrMapOvr>
+    <a:masterClrMapping/>
+  </p:clrMapOvr>
+</p:notes>
+</file>
+
+<file path=ppt/notesSlides/notesSlide6.xml><?xml version="1.0" encoding="utf-8"?>
+<p:notes xmlns:a="http://schemas.openxmlformats.org/drawingml/2006/main" xmlns:r="http://schemas.openxmlformats.org/officeDocument/2006/relationships" xmlns:p="http://schemas.openxmlformats.org/presentationml/2006/main">
+  <p:cSld>
+    <p:spTree>
+      <p:nvGrpSpPr>
+        <p:cNvPr id="1" name=""/>
+        <p:cNvGrpSpPr/>
+        <p:nvPr/>
+      </p:nvGrpSpPr>
+      <p:grpSpPr>
+        <a:xfrm>
+          <a:off x="0" y="0"/>
+          <a:ext cx="0" cy="0"/>
+          <a:chOff x="0" y="0"/>
+          <a:chExt cx="0" cy="0"/>
+        </a:xfrm>
+      </p:grpSpPr>
+      <p:sp>
+        <p:nvSpPr>
+          <p:cNvPr id="2" name="Slide Image Placeholder 1"/>
+          <p:cNvSpPr>
+            <a:spLocks noGrp="1" noRot="1" noChangeAspect="1"/>
+          </p:cNvSpPr>
+          <p:nvPr>
+            <p:ph type="sldImg"/>
+          </p:nvPr>
+        </p:nvSpPr>
+        <p:spPr/>
+      </p:sp>
+      <p:sp>
+        <p:nvSpPr>
+          <p:cNvPr id="3" name="Notes Placeholder 2"/>
+          <p:cNvSpPr>
+            <a:spLocks noGrp="1"/>
+          </p:cNvSpPr>
+          <p:nvPr>
+            <p:ph type="body" idx="1"/>
+          </p:nvPr>
+        </p:nvSpPr>
+        <p:spPr/>
+        <p:txBody>
+          <a:bodyPr/>
+          <a:lstStyle/>
+          <a:p>
+            <a:endParaRPr lang="en-US" dirty="0"/>
+          </a:p>
+        </p:txBody>
+      </p:sp>
+      <p:sp>
+        <p:nvSpPr>
+          <p:cNvPr id="4" name="Slide Number Placeholder 3"/>
+          <p:cNvSpPr>
+            <a:spLocks noGrp="1"/>
+          </p:cNvSpPr>
+          <p:nvPr>
+            <p:ph type="sldNum" sz="quarter" idx="5"/>
+          </p:nvPr>
+        </p:nvSpPr>
+        <p:spPr/>
+        <p:txBody>
+          <a:bodyPr/>
+          <a:lstStyle/>
+          <a:p>
+            <a:fld id="{9D3D7918-AA78-C342-A684-3E56169E53EA}" type="slidenum">
+              <a:rPr lang="en-US" smtClean="0"/>
+              <a:t>12</a:t>
             </a:fld>
             <a:endParaRPr lang="en-US"/>
           </a:p>
@@ -4806,7 +4892,7 @@
           <p:cNvPr id="2" name="Title 1">
             <a:extLst>
               <a:ext uri="{FF2B5EF4-FFF2-40B4-BE49-F238E27FC236}">
-                <a16:creationId xmlns:a16="http://schemas.microsoft.com/office/drawing/2014/main" id="{A341A0B1-78E3-EDB1-5185-C305BE9DFB4F}"/>
+                <a16:creationId xmlns:a16="http://schemas.microsoft.com/office/drawing/2014/main" id="{0D3B47F1-FA9F-46FB-B9EB-775C904A8F26}"/>
               </a:ext>
             </a:extLst>
           </p:cNvPr>
@@ -4824,7 +4910,7 @@
           <a:p>
             <a:r>
               <a:rPr lang="en-US" dirty="0"/>
-              <a:t>One more note</a:t>
+              <a:t>The real reason we’re here</a:t>
             </a:r>
           </a:p>
         </p:txBody>
@@ -4834,7 +4920,7 @@
           <p:cNvPr id="3" name="Content Placeholder 2">
             <a:extLst>
               <a:ext uri="{FF2B5EF4-FFF2-40B4-BE49-F238E27FC236}">
-                <a16:creationId xmlns:a16="http://schemas.microsoft.com/office/drawing/2014/main" id="{CEAD6FBB-05B4-373D-BA64-41AADC6A8867}"/>
+                <a16:creationId xmlns:a16="http://schemas.microsoft.com/office/drawing/2014/main" id="{C1FE0D4E-56EC-EA5B-885E-EDF41F53CCD9}"/>
               </a:ext>
             </a:extLst>
           </p:cNvPr>
@@ -4847,117 +4933,30 @@
         </p:nvSpPr>
         <p:spPr/>
         <p:txBody>
-          <a:bodyPr>
-            <a:normAutofit/>
-          </a:bodyPr>
+          <a:bodyPr/>
           <a:lstStyle/>
           <a:p>
-            <a:pPr marL="342900" marR="0" lvl="0" indent="-342900">
-              <a:lnSpc>
-                <a:spcPct val="107000"/>
-              </a:lnSpc>
-              <a:spcBef>
-                <a:spcPts val="0"/>
-              </a:spcBef>
-              <a:spcAft>
-                <a:spcPts val="0"/>
-              </a:spcAft>
-              <a:buFont typeface="Arial" panose="020B0604020202020204" pitchFamily="34" charset="0"/>
-              <a:buChar char="•"/>
-              <a:tabLst>
-                <a:tab pos="457200" algn="l"/>
-              </a:tabLst>
-            </a:pPr>
-            <a:r>
-              <a:rPr lang="en-US" dirty="0">
-                <a:solidFill>
-                  <a:srgbClr val="000000"/>
-                </a:solidFill>
-                <a:effectLst/>
-                <a:ea typeface="Times New Roman" panose="02020603050405020304" pitchFamily="18" charset="0"/>
-                <a:cs typeface="Times New Roman" panose="02020603050405020304" pitchFamily="18" charset="0"/>
-              </a:rPr>
-              <a:t>Remember that this class is built with students with </a:t>
-            </a:r>
-            <a:r>
-              <a:rPr lang="en-US" b="1" u="sng" dirty="0">
-                <a:solidFill>
-                  <a:srgbClr val="000000"/>
-                </a:solidFill>
-                <a:effectLst/>
-                <a:ea typeface="Times New Roman" panose="02020603050405020304" pitchFamily="18" charset="0"/>
-                <a:cs typeface="Times New Roman" panose="02020603050405020304" pitchFamily="18" charset="0"/>
-              </a:rPr>
-              <a:t>no prior coding experience</a:t>
-            </a:r>
-            <a:r>
-              <a:rPr lang="en-US" b="1" dirty="0">
-                <a:solidFill>
-                  <a:srgbClr val="000000"/>
-                </a:solidFill>
-                <a:effectLst/>
-                <a:ea typeface="Times New Roman" panose="02020603050405020304" pitchFamily="18" charset="0"/>
-                <a:cs typeface="Times New Roman" panose="02020603050405020304" pitchFamily="18" charset="0"/>
-              </a:rPr>
-              <a:t> </a:t>
-            </a:r>
-            <a:r>
-              <a:rPr lang="en-US" dirty="0">
-                <a:solidFill>
-                  <a:srgbClr val="000000"/>
-                </a:solidFill>
-                <a:effectLst/>
-                <a:ea typeface="Times New Roman" panose="02020603050405020304" pitchFamily="18" charset="0"/>
-                <a:cs typeface="Times New Roman" panose="02020603050405020304" pitchFamily="18" charset="0"/>
-              </a:rPr>
-              <a:t>in mind</a:t>
-            </a:r>
-            <a:endParaRPr lang="en-US" dirty="0">
-              <a:effectLst/>
-              <a:ea typeface="Calibri" panose="020F0502020204030204" pitchFamily="34" charset="0"/>
-              <a:cs typeface="Times New Roman" panose="02020603050405020304" pitchFamily="18" charset="0"/>
-            </a:endParaRPr>
-          </a:p>
-          <a:p>
-            <a:pPr marL="342900" marR="0" lvl="0" indent="-342900">
-              <a:lnSpc>
-                <a:spcPct val="107000"/>
-              </a:lnSpc>
-              <a:spcBef>
-                <a:spcPts val="0"/>
-              </a:spcBef>
-              <a:spcAft>
-                <a:spcPts val="0"/>
-              </a:spcAft>
-              <a:buFont typeface="Arial" panose="020B0604020202020204" pitchFamily="34" charset="0"/>
-              <a:buChar char="•"/>
-              <a:tabLst>
-                <a:tab pos="457200" algn="l"/>
-              </a:tabLst>
-            </a:pPr>
-            <a:r>
-              <a:rPr lang="en-US" dirty="0">
-                <a:solidFill>
-                  <a:srgbClr val="000000"/>
-                </a:solidFill>
-                <a:effectLst/>
-                <a:ea typeface="Times New Roman" panose="02020603050405020304" pitchFamily="18" charset="0"/>
-                <a:cs typeface="Times New Roman" panose="02020603050405020304" pitchFamily="18" charset="0"/>
-              </a:rPr>
-              <a:t>You will encounter challenges every week that will stretch your abilities, but you will be graded primarily on conceptual understanding, not on deploying enterprise-level code</a:t>
-            </a:r>
-            <a:endParaRPr lang="en-US" dirty="0">
-              <a:effectLst/>
-              <a:ea typeface="Calibri" panose="020F0502020204030204" pitchFamily="34" charset="0"/>
-              <a:cs typeface="Times New Roman" panose="02020603050405020304" pitchFamily="18" charset="0"/>
-            </a:endParaRPr>
+            <a:r>
+              <a:rPr lang="en-US" dirty="0"/>
+              <a:t>The title of the class is Data Bootcamp, and it will indeed be a hands-on, practical introduction to Python and other tools for modern data analysis</a:t>
+            </a:r>
+          </a:p>
+          <a:p>
+            <a:r>
+              <a:rPr lang="en-US" dirty="0"/>
+              <a:t>But the fundamental value of this course is simple: </a:t>
+            </a:r>
+            <a:r>
+              <a:rPr lang="en-US" b="1" u="sng" dirty="0"/>
+              <a:t>coding is a skill that, like writing, has the power to change your life for the better.</a:t>
+            </a:r>
           </a:p>
         </p:txBody>
       </p:sp>
     </p:spTree>
     <p:extLst>
       <p:ext uri="{BB962C8B-B14F-4D97-AF65-F5344CB8AC3E}">
-        <p14:creationId xmlns:p14="http://schemas.microsoft.com/office/powerpoint/2010/main" val="1943759008"/>
+        <p14:creationId xmlns:p14="http://schemas.microsoft.com/office/powerpoint/2010/main" val="4099479152"/>
       </p:ext>
     </p:extLst>
   </p:cSld>
@@ -4989,6 +4988,189 @@
           <p:cNvPr id="2" name="Title 1">
             <a:extLst>
               <a:ext uri="{FF2B5EF4-FFF2-40B4-BE49-F238E27FC236}">
+                <a16:creationId xmlns:a16="http://schemas.microsoft.com/office/drawing/2014/main" id="{A341A0B1-78E3-EDB1-5185-C305BE9DFB4F}"/>
+              </a:ext>
+            </a:extLst>
+          </p:cNvPr>
+          <p:cNvSpPr>
+            <a:spLocks noGrp="1"/>
+          </p:cNvSpPr>
+          <p:nvPr>
+            <p:ph type="title"/>
+          </p:nvPr>
+        </p:nvSpPr>
+        <p:spPr/>
+        <p:txBody>
+          <a:bodyPr/>
+          <a:lstStyle/>
+          <a:p>
+            <a:r>
+              <a:rPr lang="en-US" dirty="0"/>
+              <a:t>One more note</a:t>
+            </a:r>
+          </a:p>
+        </p:txBody>
+      </p:sp>
+      <p:sp>
+        <p:nvSpPr>
+          <p:cNvPr id="3" name="Content Placeholder 2">
+            <a:extLst>
+              <a:ext uri="{FF2B5EF4-FFF2-40B4-BE49-F238E27FC236}">
+                <a16:creationId xmlns:a16="http://schemas.microsoft.com/office/drawing/2014/main" id="{CEAD6FBB-05B4-373D-BA64-41AADC6A8867}"/>
+              </a:ext>
+            </a:extLst>
+          </p:cNvPr>
+          <p:cNvSpPr>
+            <a:spLocks noGrp="1"/>
+          </p:cNvSpPr>
+          <p:nvPr>
+            <p:ph idx="1"/>
+          </p:nvPr>
+        </p:nvSpPr>
+        <p:spPr/>
+        <p:txBody>
+          <a:bodyPr>
+            <a:normAutofit/>
+          </a:bodyPr>
+          <a:lstStyle/>
+          <a:p>
+            <a:pPr marL="342900" marR="0" lvl="0" indent="-342900">
+              <a:lnSpc>
+                <a:spcPct val="107000"/>
+              </a:lnSpc>
+              <a:spcBef>
+                <a:spcPts val="0"/>
+              </a:spcBef>
+              <a:spcAft>
+                <a:spcPts val="0"/>
+              </a:spcAft>
+              <a:buFont typeface="Arial" panose="020B0604020202020204" pitchFamily="34" charset="0"/>
+              <a:buChar char="•"/>
+              <a:tabLst>
+                <a:tab pos="457200" algn="l"/>
+              </a:tabLst>
+            </a:pPr>
+            <a:r>
+              <a:rPr lang="en-US" dirty="0">
+                <a:solidFill>
+                  <a:srgbClr val="000000"/>
+                </a:solidFill>
+                <a:effectLst/>
+                <a:ea typeface="Times New Roman" panose="02020603050405020304" pitchFamily="18" charset="0"/>
+                <a:cs typeface="Times New Roman" panose="02020603050405020304" pitchFamily="18" charset="0"/>
+              </a:rPr>
+              <a:t>Remember that this class is built with students with </a:t>
+            </a:r>
+            <a:r>
+              <a:rPr lang="en-US" b="1" u="sng" dirty="0">
+                <a:solidFill>
+                  <a:srgbClr val="000000"/>
+                </a:solidFill>
+                <a:effectLst/>
+                <a:ea typeface="Times New Roman" panose="02020603050405020304" pitchFamily="18" charset="0"/>
+                <a:cs typeface="Times New Roman" panose="02020603050405020304" pitchFamily="18" charset="0"/>
+              </a:rPr>
+              <a:t>no prior coding experience</a:t>
+            </a:r>
+            <a:r>
+              <a:rPr lang="en-US" b="1" dirty="0">
+                <a:solidFill>
+                  <a:srgbClr val="000000"/>
+                </a:solidFill>
+                <a:effectLst/>
+                <a:ea typeface="Times New Roman" panose="02020603050405020304" pitchFamily="18" charset="0"/>
+                <a:cs typeface="Times New Roman" panose="02020603050405020304" pitchFamily="18" charset="0"/>
+              </a:rPr>
+              <a:t> </a:t>
+            </a:r>
+            <a:r>
+              <a:rPr lang="en-US" dirty="0">
+                <a:solidFill>
+                  <a:srgbClr val="000000"/>
+                </a:solidFill>
+                <a:effectLst/>
+                <a:ea typeface="Times New Roman" panose="02020603050405020304" pitchFamily="18" charset="0"/>
+                <a:cs typeface="Times New Roman" panose="02020603050405020304" pitchFamily="18" charset="0"/>
+              </a:rPr>
+              <a:t>in mind</a:t>
+            </a:r>
+            <a:endParaRPr lang="en-US" dirty="0">
+              <a:effectLst/>
+              <a:ea typeface="Calibri" panose="020F0502020204030204" pitchFamily="34" charset="0"/>
+              <a:cs typeface="Times New Roman" panose="02020603050405020304" pitchFamily="18" charset="0"/>
+            </a:endParaRPr>
+          </a:p>
+          <a:p>
+            <a:pPr marL="342900" marR="0" lvl="0" indent="-342900">
+              <a:lnSpc>
+                <a:spcPct val="107000"/>
+              </a:lnSpc>
+              <a:spcBef>
+                <a:spcPts val="0"/>
+              </a:spcBef>
+              <a:spcAft>
+                <a:spcPts val="0"/>
+              </a:spcAft>
+              <a:buFont typeface="Arial" panose="020B0604020202020204" pitchFamily="34" charset="0"/>
+              <a:buChar char="•"/>
+              <a:tabLst>
+                <a:tab pos="457200" algn="l"/>
+              </a:tabLst>
+            </a:pPr>
+            <a:r>
+              <a:rPr lang="en-US" dirty="0">
+                <a:solidFill>
+                  <a:srgbClr val="000000"/>
+                </a:solidFill>
+                <a:effectLst/>
+                <a:ea typeface="Times New Roman" panose="02020603050405020304" pitchFamily="18" charset="0"/>
+                <a:cs typeface="Times New Roman" panose="02020603050405020304" pitchFamily="18" charset="0"/>
+              </a:rPr>
+              <a:t>You will encounter challenges every week that will stretch your abilities, but you will be graded primarily on conceptual understanding, not on deploying enterprise-level code</a:t>
+            </a:r>
+            <a:endParaRPr lang="en-US" dirty="0">
+              <a:effectLst/>
+              <a:ea typeface="Calibri" panose="020F0502020204030204" pitchFamily="34" charset="0"/>
+              <a:cs typeface="Times New Roman" panose="02020603050405020304" pitchFamily="18" charset="0"/>
+            </a:endParaRPr>
+          </a:p>
+        </p:txBody>
+      </p:sp>
+    </p:spTree>
+    <p:extLst>
+      <p:ext uri="{BB962C8B-B14F-4D97-AF65-F5344CB8AC3E}">
+        <p14:creationId xmlns:p14="http://schemas.microsoft.com/office/powerpoint/2010/main" val="1943759008"/>
+      </p:ext>
+    </p:extLst>
+  </p:cSld>
+  <p:clrMapOvr>
+    <a:masterClrMapping/>
+  </p:clrMapOvr>
+</p:sld>
+</file>
+
+<file path=ppt/slides/slide12.xml><?xml version="1.0" encoding="utf-8"?>
+<p:sld xmlns:a="http://schemas.openxmlformats.org/drawingml/2006/main" xmlns:r="http://schemas.openxmlformats.org/officeDocument/2006/relationships" xmlns:p="http://schemas.openxmlformats.org/presentationml/2006/main">
+  <p:cSld>
+    <p:spTree>
+      <p:nvGrpSpPr>
+        <p:cNvPr id="1" name=""/>
+        <p:cNvGrpSpPr/>
+        <p:nvPr/>
+      </p:nvGrpSpPr>
+      <p:grpSpPr>
+        <a:xfrm>
+          <a:off x="0" y="0"/>
+          <a:ext cx="0" cy="0"/>
+          <a:chOff x="0" y="0"/>
+          <a:chExt cx="0" cy="0"/>
+        </a:xfrm>
+      </p:grpSpPr>
+      <p:sp>
+        <p:nvSpPr>
+          <p:cNvPr id="2" name="Title 1">
+            <a:extLst>
+              <a:ext uri="{FF2B5EF4-FFF2-40B4-BE49-F238E27FC236}">
                 <a16:creationId xmlns:a16="http://schemas.microsoft.com/office/drawing/2014/main" id="{BF0B5172-27B5-37A4-CDDD-FAFD47F5138F}"/>
               </a:ext>
             </a:extLst>
@@ -5103,7 +5285,7 @@
             <a:fld id="{385D30D2-2F6A-2D4E-9EB9-92F00C848FE9}" type="slidenum">
               <a:rPr lang="en-US" smtClean="0"/>
               <a:pPr/>
-              <a:t>11</a:t>
+              <a:t>12</a:t>
             </a:fld>
             <a:endParaRPr lang="en-US"/>
           </a:p>
@@ -5694,7 +5876,7 @@
 </p:sld>
 </file>
 
-<file path=ppt/slides/slide12.xml><?xml version="1.0" encoding="utf-8"?>
+<file path=ppt/slides/slide13.xml><?xml version="1.0" encoding="utf-8"?>
 <p:sld xmlns:a="http://schemas.openxmlformats.org/drawingml/2006/main" xmlns:r="http://schemas.openxmlformats.org/officeDocument/2006/relationships" xmlns:p="http://schemas.openxmlformats.org/presentationml/2006/main">
   <p:cSld>
     <p:spTree>
@@ -5780,7 +5962,7 @@
 </p:sld>
 </file>
 
-<file path=ppt/slides/slide13.xml><?xml version="1.0" encoding="utf-8"?>
+<file path=ppt/slides/slide14.xml><?xml version="1.0" encoding="utf-8"?>
 <p:sld xmlns:a="http://schemas.openxmlformats.org/drawingml/2006/main" xmlns:r="http://schemas.openxmlformats.org/officeDocument/2006/relationships" xmlns:p="http://schemas.openxmlformats.org/presentationml/2006/main">
   <p:cSld>
     <p:spTree>
@@ -6078,7 +6260,7 @@
 </p:sld>
 </file>
 
-<file path=ppt/slides/slide14.xml><?xml version="1.0" encoding="utf-8"?>
+<file path=ppt/slides/slide15.xml><?xml version="1.0" encoding="utf-8"?>
 <p:sld xmlns:a="http://schemas.openxmlformats.org/drawingml/2006/main" xmlns:r="http://schemas.openxmlformats.org/officeDocument/2006/relationships" xmlns:p="http://schemas.openxmlformats.org/presentationml/2006/main">
   <p:cSld>
     <p:spTree>
@@ -6437,7 +6619,7 @@
 </p:sld>
 </file>
 
-<file path=ppt/slides/slide15.xml><?xml version="1.0" encoding="utf-8"?>
+<file path=ppt/slides/slide16.xml><?xml version="1.0" encoding="utf-8"?>
 <p:sld xmlns:a="http://schemas.openxmlformats.org/drawingml/2006/main" xmlns:r="http://schemas.openxmlformats.org/officeDocument/2006/relationships" xmlns:p="http://schemas.openxmlformats.org/presentationml/2006/main">
   <p:cSld>
     <p:spTree>
@@ -6729,7 +6911,7 @@
 </p:sld>
 </file>
 
-<file path=ppt/slides/slide16.xml><?xml version="1.0" encoding="utf-8"?>
+<file path=ppt/slides/slide17.xml><?xml version="1.0" encoding="utf-8"?>
 <p:sld xmlns:a="http://schemas.openxmlformats.org/drawingml/2006/main" xmlns:r="http://schemas.openxmlformats.org/officeDocument/2006/relationships" xmlns:p="http://schemas.openxmlformats.org/presentationml/2006/main">
   <p:cSld>
     <p:spTree>
@@ -6925,7 +7107,7 @@
 </p:sld>
 </file>
 
-<file path=ppt/slides/slide17.xml><?xml version="1.0" encoding="utf-8"?>
+<file path=ppt/slides/slide18.xml><?xml version="1.0" encoding="utf-8"?>
 <p:sld xmlns:a="http://schemas.openxmlformats.org/drawingml/2006/main" xmlns:r="http://schemas.openxmlformats.org/officeDocument/2006/relationships" xmlns:p="http://schemas.openxmlformats.org/presentationml/2006/main">
   <p:cSld>
     <p:spTree>
@@ -7427,92 +7609,6 @@
 </p:sld>
 </file>
 
-<file path=ppt/slides/slide18.xml><?xml version="1.0" encoding="utf-8"?>
-<p:sld xmlns:a="http://schemas.openxmlformats.org/drawingml/2006/main" xmlns:r="http://schemas.openxmlformats.org/officeDocument/2006/relationships" xmlns:p="http://schemas.openxmlformats.org/presentationml/2006/main">
-  <p:cSld>
-    <p:spTree>
-      <p:nvGrpSpPr>
-        <p:cNvPr id="1" name=""/>
-        <p:cNvGrpSpPr/>
-        <p:nvPr/>
-      </p:nvGrpSpPr>
-      <p:grpSpPr>
-        <a:xfrm>
-          <a:off x="0" y="0"/>
-          <a:ext cx="0" cy="0"/>
-          <a:chOff x="0" y="0"/>
-          <a:chExt cx="0" cy="0"/>
-        </a:xfrm>
-      </p:grpSpPr>
-      <p:sp>
-        <p:nvSpPr>
-          <p:cNvPr id="2" name="Title 1">
-            <a:extLst>
-              <a:ext uri="{FF2B5EF4-FFF2-40B4-BE49-F238E27FC236}">
-                <a16:creationId xmlns:a16="http://schemas.microsoft.com/office/drawing/2014/main" id="{BCB6561C-2E2A-9A6F-6D8A-339192561F15}"/>
-              </a:ext>
-            </a:extLst>
-          </p:cNvPr>
-          <p:cNvSpPr>
-            <a:spLocks noGrp="1"/>
-          </p:cNvSpPr>
-          <p:nvPr>
-            <p:ph type="title"/>
-          </p:nvPr>
-        </p:nvSpPr>
-        <p:spPr/>
-        <p:txBody>
-          <a:bodyPr/>
-          <a:lstStyle/>
-          <a:p>
-            <a:r>
-              <a:rPr lang="en-US" dirty="0"/>
-              <a:t>Bain interlude</a:t>
-            </a:r>
-          </a:p>
-        </p:txBody>
-      </p:sp>
-      <p:sp>
-        <p:nvSpPr>
-          <p:cNvPr id="3" name="Content Placeholder 2">
-            <a:extLst>
-              <a:ext uri="{FF2B5EF4-FFF2-40B4-BE49-F238E27FC236}">
-                <a16:creationId xmlns:a16="http://schemas.microsoft.com/office/drawing/2014/main" id="{0BF998E7-FC55-77D9-2BFE-D492CFDF2FA2}"/>
-              </a:ext>
-            </a:extLst>
-          </p:cNvPr>
-          <p:cNvSpPr>
-            <a:spLocks noGrp="1"/>
-          </p:cNvSpPr>
-          <p:nvPr>
-            <p:ph idx="1"/>
-          </p:nvPr>
-        </p:nvSpPr>
-        <p:spPr/>
-        <p:txBody>
-          <a:bodyPr/>
-          <a:lstStyle/>
-          <a:p>
-            <a:r>
-              <a:rPr lang="en-US" dirty="0"/>
-              <a:t>Using code to make my life just a little easier</a:t>
-            </a:r>
-          </a:p>
-        </p:txBody>
-      </p:sp>
-    </p:spTree>
-    <p:extLst>
-      <p:ext uri="{BB962C8B-B14F-4D97-AF65-F5344CB8AC3E}">
-        <p14:creationId xmlns:p14="http://schemas.microsoft.com/office/powerpoint/2010/main" val="3624139819"/>
-      </p:ext>
-    </p:extLst>
-  </p:cSld>
-  <p:clrMapOvr>
-    <a:masterClrMapping/>
-  </p:clrMapOvr>
-</p:sld>
-</file>
-
 <file path=ppt/slides/slide19.xml><?xml version="1.0" encoding="utf-8"?>
 <p:sld xmlns:a="http://schemas.openxmlformats.org/drawingml/2006/main" xmlns:r="http://schemas.openxmlformats.org/officeDocument/2006/relationships" xmlns:p="http://schemas.openxmlformats.org/presentationml/2006/main">
   <p:cSld>
@@ -7553,7 +7649,35 @@
           <a:p>
             <a:r>
               <a:rPr lang="en-US" dirty="0"/>
-              <a:t>Where is this stoking your imagination?</a:t>
+              <a:t>Bain interlude</a:t>
+            </a:r>
+          </a:p>
+        </p:txBody>
+      </p:sp>
+      <p:sp>
+        <p:nvSpPr>
+          <p:cNvPr id="3" name="Content Placeholder 2">
+            <a:extLst>
+              <a:ext uri="{FF2B5EF4-FFF2-40B4-BE49-F238E27FC236}">
+                <a16:creationId xmlns:a16="http://schemas.microsoft.com/office/drawing/2014/main" id="{0BF998E7-FC55-77D9-2BFE-D492CFDF2FA2}"/>
+              </a:ext>
+            </a:extLst>
+          </p:cNvPr>
+          <p:cNvSpPr>
+            <a:spLocks noGrp="1"/>
+          </p:cNvSpPr>
+          <p:nvPr>
+            <p:ph idx="1"/>
+          </p:nvPr>
+        </p:nvSpPr>
+        <p:spPr/>
+        <p:txBody>
+          <a:bodyPr/>
+          <a:lstStyle/>
+          <a:p>
+            <a:r>
+              <a:rPr lang="en-US" dirty="0"/>
+              <a:t>Using code to make my life just a little easier</a:t>
             </a:r>
           </a:p>
         </p:txBody>
@@ -7561,7 +7685,7 @@
     </p:spTree>
     <p:extLst>
       <p:ext uri="{BB962C8B-B14F-4D97-AF65-F5344CB8AC3E}">
-        <p14:creationId xmlns:p14="http://schemas.microsoft.com/office/powerpoint/2010/main" val="2085043480"/>
+        <p14:creationId xmlns:p14="http://schemas.microsoft.com/office/powerpoint/2010/main" val="3624139819"/>
       </p:ext>
     </p:extLst>
   </p:cSld>
@@ -8052,6 +8176,64 @@
       </p:grpSpPr>
       <p:sp>
         <p:nvSpPr>
+          <p:cNvPr id="2" name="Title 1">
+            <a:extLst>
+              <a:ext uri="{FF2B5EF4-FFF2-40B4-BE49-F238E27FC236}">
+                <a16:creationId xmlns:a16="http://schemas.microsoft.com/office/drawing/2014/main" id="{BCB6561C-2E2A-9A6F-6D8A-339192561F15}"/>
+              </a:ext>
+            </a:extLst>
+          </p:cNvPr>
+          <p:cNvSpPr>
+            <a:spLocks noGrp="1"/>
+          </p:cNvSpPr>
+          <p:nvPr>
+            <p:ph type="title"/>
+          </p:nvPr>
+        </p:nvSpPr>
+        <p:spPr/>
+        <p:txBody>
+          <a:bodyPr/>
+          <a:lstStyle/>
+          <a:p>
+            <a:r>
+              <a:rPr lang="en-US" dirty="0"/>
+              <a:t>Where is this stoking your imagination?</a:t>
+            </a:r>
+          </a:p>
+        </p:txBody>
+      </p:sp>
+    </p:spTree>
+    <p:extLst>
+      <p:ext uri="{BB962C8B-B14F-4D97-AF65-F5344CB8AC3E}">
+        <p14:creationId xmlns:p14="http://schemas.microsoft.com/office/powerpoint/2010/main" val="2085043480"/>
+      </p:ext>
+    </p:extLst>
+  </p:cSld>
+  <p:clrMapOvr>
+    <a:masterClrMapping/>
+  </p:clrMapOvr>
+</p:sld>
+</file>
+
+<file path=ppt/slides/slide21.xml><?xml version="1.0" encoding="utf-8"?>
+<p:sld xmlns:a="http://schemas.openxmlformats.org/drawingml/2006/main" xmlns:r="http://schemas.openxmlformats.org/officeDocument/2006/relationships" xmlns:p="http://schemas.openxmlformats.org/presentationml/2006/main">
+  <p:cSld>
+    <p:spTree>
+      <p:nvGrpSpPr>
+        <p:cNvPr id="1" name=""/>
+        <p:cNvGrpSpPr/>
+        <p:nvPr/>
+      </p:nvGrpSpPr>
+      <p:grpSpPr>
+        <a:xfrm>
+          <a:off x="0" y="0"/>
+          <a:ext cx="0" cy="0"/>
+          <a:chOff x="0" y="0"/>
+          <a:chExt cx="0" cy="0"/>
+        </a:xfrm>
+      </p:grpSpPr>
+      <p:sp>
+        <p:nvSpPr>
           <p:cNvPr id="6" name="Content Placeholder 2">
             <a:extLst>
               <a:ext uri="{FF2B5EF4-FFF2-40B4-BE49-F238E27FC236}">
@@ -8495,147 +8677,6 @@
 </p:sld>
 </file>
 
-<file path=ppt/slides/slide21.xml><?xml version="1.0" encoding="utf-8"?>
-<p:sld xmlns:a="http://schemas.openxmlformats.org/drawingml/2006/main" xmlns:r="http://schemas.openxmlformats.org/officeDocument/2006/relationships" xmlns:p="http://schemas.openxmlformats.org/presentationml/2006/main">
-  <p:cSld>
-    <p:spTree>
-      <p:nvGrpSpPr>
-        <p:cNvPr id="1" name=""/>
-        <p:cNvGrpSpPr/>
-        <p:nvPr/>
-      </p:nvGrpSpPr>
-      <p:grpSpPr>
-        <a:xfrm>
-          <a:off x="0" y="0"/>
-          <a:ext cx="0" cy="0"/>
-          <a:chOff x="0" y="0"/>
-          <a:chExt cx="0" cy="0"/>
-        </a:xfrm>
-      </p:grpSpPr>
-      <p:sp>
-        <p:nvSpPr>
-          <p:cNvPr id="2" name="Title 1">
-            <a:extLst>
-              <a:ext uri="{FF2B5EF4-FFF2-40B4-BE49-F238E27FC236}">
-                <a16:creationId xmlns:a16="http://schemas.microsoft.com/office/drawing/2014/main" id="{72520D94-AE1A-E77E-9762-D3A3D35BE366}"/>
-              </a:ext>
-            </a:extLst>
-          </p:cNvPr>
-          <p:cNvSpPr>
-            <a:spLocks noGrp="1"/>
-          </p:cNvSpPr>
-          <p:nvPr>
-            <p:ph type="title"/>
-          </p:nvPr>
-        </p:nvSpPr>
-        <p:spPr/>
-        <p:txBody>
-          <a:bodyPr/>
-          <a:lstStyle/>
-          <a:p>
-            <a:r>
-              <a:rPr lang="en-US" dirty="0"/>
-              <a:t>Keep your eye out for data you want to work with</a:t>
-            </a:r>
-          </a:p>
-        </p:txBody>
-      </p:sp>
-      <p:sp>
-        <p:nvSpPr>
-          <p:cNvPr id="3" name="Content Placeholder 2">
-            <a:extLst>
-              <a:ext uri="{FF2B5EF4-FFF2-40B4-BE49-F238E27FC236}">
-                <a16:creationId xmlns:a16="http://schemas.microsoft.com/office/drawing/2014/main" id="{205820F3-0413-2251-0EC3-B8257097CC78}"/>
-              </a:ext>
-            </a:extLst>
-          </p:cNvPr>
-          <p:cNvSpPr>
-            <a:spLocks noGrp="1"/>
-          </p:cNvSpPr>
-          <p:nvPr>
-            <p:ph idx="1"/>
-          </p:nvPr>
-        </p:nvSpPr>
-        <p:spPr/>
-        <p:txBody>
-          <a:bodyPr/>
-          <a:lstStyle/>
-          <a:p>
-            <a:r>
-              <a:rPr lang="en-US" dirty="0"/>
-              <a:t>You’ll need datasets for your midterm and final projects</a:t>
-            </a:r>
-          </a:p>
-          <a:p>
-            <a:r>
-              <a:rPr lang="en-US" dirty="0"/>
-              <a:t>Ideal datasets for this class are:</a:t>
-            </a:r>
-          </a:p>
-          <a:p>
-            <a:pPr lvl="1"/>
-            <a:r>
-              <a:rPr lang="en-US" dirty="0"/>
-              <a:t>Pretty big</a:t>
-            </a:r>
-          </a:p>
-          <a:p>
-            <a:pPr lvl="1"/>
-            <a:r>
-              <a:rPr lang="en-US" dirty="0"/>
-              <a:t>Genuinely interesting to you</a:t>
-            </a:r>
-          </a:p>
-          <a:p>
-            <a:pPr lvl="1"/>
-            <a:r>
-              <a:rPr lang="en-US" dirty="0"/>
-              <a:t>Able to convey insights that are actually interesting (not just, “the average home price was X”)</a:t>
-            </a:r>
-          </a:p>
-          <a:p>
-            <a:pPr lvl="1"/>
-            <a:r>
-              <a:rPr lang="en-US" dirty="0"/>
-              <a:t>A little unusual / on a topic off the beaten path</a:t>
-            </a:r>
-          </a:p>
-          <a:p>
-            <a:pPr lvl="1"/>
-            <a:r>
-              <a:rPr lang="en-US" dirty="0"/>
-              <a:t>Comprised of different data types (i.e., some columns are numbers, some are text, </a:t>
-            </a:r>
-            <a:r>
-              <a:rPr lang="en-US" dirty="0" err="1"/>
-              <a:t>etc</a:t>
-            </a:r>
-            <a:r>
-              <a:rPr lang="en-US" dirty="0"/>
-              <a:t>)</a:t>
-            </a:r>
-          </a:p>
-          <a:p>
-            <a:r>
-              <a:rPr lang="en-US" dirty="0"/>
-              <a:t>If you’re unsure or just want to talk it over, schedule some time with me</a:t>
-            </a:r>
-          </a:p>
-        </p:txBody>
-      </p:sp>
-    </p:spTree>
-    <p:extLst>
-      <p:ext uri="{BB962C8B-B14F-4D97-AF65-F5344CB8AC3E}">
-        <p14:creationId xmlns:p14="http://schemas.microsoft.com/office/powerpoint/2010/main" val="691251022"/>
-      </p:ext>
-    </p:extLst>
-  </p:cSld>
-  <p:clrMapOvr>
-    <a:masterClrMapping/>
-  </p:clrMapOvr>
-</p:sld>
-</file>
-
 <file path=ppt/slides/slide22.xml><?xml version="1.0" encoding="utf-8"?>
 <p:sld xmlns:a="http://schemas.openxmlformats.org/drawingml/2006/main" xmlns:r="http://schemas.openxmlformats.org/officeDocument/2006/relationships" xmlns:p="http://schemas.openxmlformats.org/presentationml/2006/main">
   <p:cSld>
@@ -8658,6 +8699,147 @@
           <p:cNvPr id="2" name="Title 1">
             <a:extLst>
               <a:ext uri="{FF2B5EF4-FFF2-40B4-BE49-F238E27FC236}">
+                <a16:creationId xmlns:a16="http://schemas.microsoft.com/office/drawing/2014/main" id="{72520D94-AE1A-E77E-9762-D3A3D35BE366}"/>
+              </a:ext>
+            </a:extLst>
+          </p:cNvPr>
+          <p:cNvSpPr>
+            <a:spLocks noGrp="1"/>
+          </p:cNvSpPr>
+          <p:nvPr>
+            <p:ph type="title"/>
+          </p:nvPr>
+        </p:nvSpPr>
+        <p:spPr/>
+        <p:txBody>
+          <a:bodyPr/>
+          <a:lstStyle/>
+          <a:p>
+            <a:r>
+              <a:rPr lang="en-US" dirty="0"/>
+              <a:t>Keep your eye out for data you want to work with</a:t>
+            </a:r>
+          </a:p>
+        </p:txBody>
+      </p:sp>
+      <p:sp>
+        <p:nvSpPr>
+          <p:cNvPr id="3" name="Content Placeholder 2">
+            <a:extLst>
+              <a:ext uri="{FF2B5EF4-FFF2-40B4-BE49-F238E27FC236}">
+                <a16:creationId xmlns:a16="http://schemas.microsoft.com/office/drawing/2014/main" id="{205820F3-0413-2251-0EC3-B8257097CC78}"/>
+              </a:ext>
+            </a:extLst>
+          </p:cNvPr>
+          <p:cNvSpPr>
+            <a:spLocks noGrp="1"/>
+          </p:cNvSpPr>
+          <p:nvPr>
+            <p:ph idx="1"/>
+          </p:nvPr>
+        </p:nvSpPr>
+        <p:spPr/>
+        <p:txBody>
+          <a:bodyPr/>
+          <a:lstStyle/>
+          <a:p>
+            <a:r>
+              <a:rPr lang="en-US" dirty="0"/>
+              <a:t>You’ll need datasets for your midterm and final projects</a:t>
+            </a:r>
+          </a:p>
+          <a:p>
+            <a:r>
+              <a:rPr lang="en-US" dirty="0"/>
+              <a:t>Ideal datasets for this class are:</a:t>
+            </a:r>
+          </a:p>
+          <a:p>
+            <a:pPr lvl="1"/>
+            <a:r>
+              <a:rPr lang="en-US" dirty="0"/>
+              <a:t>Pretty big</a:t>
+            </a:r>
+          </a:p>
+          <a:p>
+            <a:pPr lvl="1"/>
+            <a:r>
+              <a:rPr lang="en-US" dirty="0"/>
+              <a:t>Genuinely interesting to you</a:t>
+            </a:r>
+          </a:p>
+          <a:p>
+            <a:pPr lvl="1"/>
+            <a:r>
+              <a:rPr lang="en-US" dirty="0"/>
+              <a:t>Able to convey insights that are actually interesting (not just, “the average home price was X”)</a:t>
+            </a:r>
+          </a:p>
+          <a:p>
+            <a:pPr lvl="1"/>
+            <a:r>
+              <a:rPr lang="en-US" dirty="0"/>
+              <a:t>A little unusual / on a topic off the beaten path</a:t>
+            </a:r>
+          </a:p>
+          <a:p>
+            <a:pPr lvl="1"/>
+            <a:r>
+              <a:rPr lang="en-US" dirty="0"/>
+              <a:t>Comprised of different data types (i.e., some columns are numbers, some are text, </a:t>
+            </a:r>
+            <a:r>
+              <a:rPr lang="en-US" dirty="0" err="1"/>
+              <a:t>etc</a:t>
+            </a:r>
+            <a:r>
+              <a:rPr lang="en-US" dirty="0"/>
+              <a:t>)</a:t>
+            </a:r>
+          </a:p>
+          <a:p>
+            <a:r>
+              <a:rPr lang="en-US" dirty="0"/>
+              <a:t>If you’re unsure or just want to talk it over, schedule some time with me</a:t>
+            </a:r>
+          </a:p>
+        </p:txBody>
+      </p:sp>
+    </p:spTree>
+    <p:extLst>
+      <p:ext uri="{BB962C8B-B14F-4D97-AF65-F5344CB8AC3E}">
+        <p14:creationId xmlns:p14="http://schemas.microsoft.com/office/powerpoint/2010/main" val="691251022"/>
+      </p:ext>
+    </p:extLst>
+  </p:cSld>
+  <p:clrMapOvr>
+    <a:masterClrMapping/>
+  </p:clrMapOvr>
+</p:sld>
+</file>
+
+<file path=ppt/slides/slide23.xml><?xml version="1.0" encoding="utf-8"?>
+<p:sld xmlns:a="http://schemas.openxmlformats.org/drawingml/2006/main" xmlns:r="http://schemas.openxmlformats.org/officeDocument/2006/relationships" xmlns:p="http://schemas.openxmlformats.org/presentationml/2006/main">
+  <p:cSld>
+    <p:spTree>
+      <p:nvGrpSpPr>
+        <p:cNvPr id="1" name=""/>
+        <p:cNvGrpSpPr/>
+        <p:nvPr/>
+      </p:nvGrpSpPr>
+      <p:grpSpPr>
+        <a:xfrm>
+          <a:off x="0" y="0"/>
+          <a:ext cx="0" cy="0"/>
+          <a:chOff x="0" y="0"/>
+          <a:chExt cx="0" cy="0"/>
+        </a:xfrm>
+      </p:grpSpPr>
+      <p:sp>
+        <p:nvSpPr>
+          <p:cNvPr id="2" name="Title 1">
+            <a:extLst>
+              <a:ext uri="{FF2B5EF4-FFF2-40B4-BE49-F238E27FC236}">
                 <a16:creationId xmlns:a16="http://schemas.microsoft.com/office/drawing/2014/main" id="{B7E54EBC-50D9-C6E5-5131-E808658D5283}"/>
               </a:ext>
             </a:extLst>
@@ -8760,6 +8942,104 @@
     <p:extLst>
       <p:ext uri="{BB962C8B-B14F-4D97-AF65-F5344CB8AC3E}">
         <p14:creationId xmlns:p14="http://schemas.microsoft.com/office/powerpoint/2010/main" val="2267297225"/>
+      </p:ext>
+    </p:extLst>
+  </p:cSld>
+  <p:clrMapOvr>
+    <a:masterClrMapping/>
+  </p:clrMapOvr>
+</p:sld>
+</file>
+
+<file path=ppt/slides/slide24.xml><?xml version="1.0" encoding="utf-8"?>
+<p:sld xmlns:a="http://schemas.openxmlformats.org/drawingml/2006/main" xmlns:r="http://schemas.openxmlformats.org/officeDocument/2006/relationships" xmlns:p="http://schemas.openxmlformats.org/presentationml/2006/main">
+  <p:cSld>
+    <p:spTree>
+      <p:nvGrpSpPr>
+        <p:cNvPr id="1" name=""/>
+        <p:cNvGrpSpPr/>
+        <p:nvPr/>
+      </p:nvGrpSpPr>
+      <p:grpSpPr>
+        <a:xfrm>
+          <a:off x="0" y="0"/>
+          <a:ext cx="0" cy="0"/>
+          <a:chOff x="0" y="0"/>
+          <a:chExt cx="0" cy="0"/>
+        </a:xfrm>
+      </p:grpSpPr>
+      <p:sp>
+        <p:nvSpPr>
+          <p:cNvPr id="2" name="Title 1">
+            <a:extLst>
+              <a:ext uri="{FF2B5EF4-FFF2-40B4-BE49-F238E27FC236}">
+                <a16:creationId xmlns:a16="http://schemas.microsoft.com/office/drawing/2014/main" id="{B7E54EBC-50D9-C6E5-5131-E808658D5283}"/>
+              </a:ext>
+            </a:extLst>
+          </p:cNvPr>
+          <p:cNvSpPr>
+            <a:spLocks noGrp="1"/>
+          </p:cNvSpPr>
+          <p:nvPr>
+            <p:ph type="title"/>
+          </p:nvPr>
+        </p:nvSpPr>
+        <p:spPr/>
+        <p:txBody>
+          <a:bodyPr>
+            <a:normAutofit/>
+          </a:bodyPr>
+          <a:lstStyle/>
+          <a:p>
+            <a:r>
+              <a:rPr lang="en-US" dirty="0"/>
+              <a:t>End-of-class survey</a:t>
+            </a:r>
+            <a:endParaRPr lang="en-US" i="1" dirty="0"/>
+          </a:p>
+        </p:txBody>
+      </p:sp>
+      <p:sp>
+        <p:nvSpPr>
+          <p:cNvPr id="3" name="Content Placeholder 2">
+            <a:extLst>
+              <a:ext uri="{FF2B5EF4-FFF2-40B4-BE49-F238E27FC236}">
+                <a16:creationId xmlns:a16="http://schemas.microsoft.com/office/drawing/2014/main" id="{AA3F4104-15E6-572E-9A5E-6092419D8174}"/>
+              </a:ext>
+            </a:extLst>
+          </p:cNvPr>
+          <p:cNvSpPr>
+            <a:spLocks noGrp="1"/>
+          </p:cNvSpPr>
+          <p:nvPr>
+            <p:ph idx="1"/>
+          </p:nvPr>
+        </p:nvSpPr>
+        <p:spPr/>
+        <p:txBody>
+          <a:bodyPr/>
+          <a:lstStyle/>
+          <a:p>
+            <a:pPr marL="0" indent="0">
+              <a:buNone/>
+            </a:pPr>
+            <a:r>
+              <a:rPr lang="en-US" b="1" u="sng" dirty="0">
+                <a:hlinkClick r:id="rId2"/>
+              </a:rPr>
+              <a:t>https://forms.gle/YVF1g3j8YUZDjnau7</a:t>
+            </a:r>
+            <a:r>
+              <a:rPr lang="en-US" b="1" u="sng" dirty="0"/>
+              <a:t> </a:t>
+            </a:r>
+          </a:p>
+        </p:txBody>
+      </p:sp>
+    </p:spTree>
+    <p:extLst>
+      <p:ext uri="{BB962C8B-B14F-4D97-AF65-F5344CB8AC3E}">
+        <p14:creationId xmlns:p14="http://schemas.microsoft.com/office/powerpoint/2010/main" val="3390760005"/>
       </p:ext>
     </p:extLst>
   </p:cSld>
@@ -9485,7 +9765,7 @@
           <p:cNvPr id="2" name="Title 1">
             <a:extLst>
               <a:ext uri="{FF2B5EF4-FFF2-40B4-BE49-F238E27FC236}">
-                <a16:creationId xmlns:a16="http://schemas.microsoft.com/office/drawing/2014/main" id="{0D3B47F1-FA9F-46FB-B9EB-775C904A8F26}"/>
+                <a16:creationId xmlns:a16="http://schemas.microsoft.com/office/drawing/2014/main" id="{BF0B5172-27B5-37A4-CDDD-FAFD47F5138F}"/>
               </a:ext>
             </a:extLst>
           </p:cNvPr>
@@ -9502,8 +9782,10 @@
           <a:lstStyle/>
           <a:p>
             <a:r>
-              <a:rPr lang="en-US" dirty="0"/>
-              <a:t>The real reason we’re here</a:t>
+              <a:rPr lang="en-US" dirty="0">
+                <a:latin typeface="Franklin Gothic Book" panose="020B0503020102020204" pitchFamily="34" charset="0"/>
+              </a:rPr>
+              <a:t>Beginning-of-term survey</a:t>
             </a:r>
           </a:p>
         </p:txBody>
@@ -9513,7 +9795,7 @@
           <p:cNvPr id="3" name="Content Placeholder 2">
             <a:extLst>
               <a:ext uri="{FF2B5EF4-FFF2-40B4-BE49-F238E27FC236}">
-                <a16:creationId xmlns:a16="http://schemas.microsoft.com/office/drawing/2014/main" id="{C1FE0D4E-56EC-EA5B-885E-EDF41F53CCD9}"/>
+                <a16:creationId xmlns:a16="http://schemas.microsoft.com/office/drawing/2014/main" id="{A89D7ECB-35A5-EB86-979D-67E1C63B85C6}"/>
               </a:ext>
             </a:extLst>
           </p:cNvPr>
@@ -9529,27 +9811,56 @@
           <a:bodyPr/>
           <a:lstStyle/>
           <a:p>
-            <a:r>
-              <a:rPr lang="en-US" dirty="0"/>
-              <a:t>The title of the class is Data Bootcamp, and it will indeed be a hands-on, practical introduction to Python and other tools for modern data analysis</a:t>
-            </a:r>
-          </a:p>
-          <a:p>
-            <a:r>
-              <a:rPr lang="en-US" dirty="0"/>
-              <a:t>But the fundamental value of this course is simple: </a:t>
-            </a:r>
-            <a:r>
-              <a:rPr lang="en-US" b="1" u="sng" dirty="0"/>
-              <a:t>coding is a skill that, like writing, has the power to change your life for the better.</a:t>
-            </a:r>
+            <a:pPr marL="0" indent="0">
+              <a:buNone/>
+            </a:pPr>
+            <a:r>
+              <a:rPr lang="en-US" dirty="0">
+                <a:hlinkClick r:id="rId3"/>
+              </a:rPr>
+              <a:t>https://forms.gle/3rXhbm7YKJmS68XW7</a:t>
+            </a:r>
+            <a:r>
+              <a:rPr lang="en-US" dirty="0"/>
+              <a:t> </a:t>
+            </a:r>
+          </a:p>
+        </p:txBody>
+      </p:sp>
+      <p:sp>
+        <p:nvSpPr>
+          <p:cNvPr id="4" name="Slide Number Placeholder 3">
+            <a:extLst>
+              <a:ext uri="{FF2B5EF4-FFF2-40B4-BE49-F238E27FC236}">
+                <a16:creationId xmlns:a16="http://schemas.microsoft.com/office/drawing/2014/main" id="{512974D5-9A69-C5A0-4C84-47FC5BD15619}"/>
+              </a:ext>
+            </a:extLst>
+          </p:cNvPr>
+          <p:cNvSpPr>
+            <a:spLocks noGrp="1"/>
+          </p:cNvSpPr>
+          <p:nvPr>
+            <p:ph type="sldNum" sz="quarter" idx="12"/>
+          </p:nvPr>
+        </p:nvSpPr>
+        <p:spPr/>
+        <p:txBody>
+          <a:bodyPr/>
+          <a:lstStyle/>
+          <a:p>
+            <a:fld id="{385D30D2-2F6A-2D4E-9EB9-92F00C848FE9}" type="slidenum">
+              <a:rPr lang="en-US" smtClean="0"/>
+              <a:pPr/>
+              <a:t>9</a:t>
+            </a:fld>
+            <a:endParaRPr lang="en-US"/>
           </a:p>
         </p:txBody>
       </p:sp>
     </p:spTree>
     <p:extLst>
       <p:ext uri="{BB962C8B-B14F-4D97-AF65-F5344CB8AC3E}">
-        <p14:creationId xmlns:p14="http://schemas.microsoft.com/office/powerpoint/2010/main" val="4099479152"/>
+        <p14:creationId xmlns:p14="http://schemas.microsoft.com/office/powerpoint/2010/main" val="2030209871"/>
       </p:ext>
     </p:extLst>
   </p:cSld>

</xml_diff>